<commit_message>
Added ILSpy to resources
</commit_message>
<xml_diff>
--- a/WhatsNewInCSharp9.pptx
+++ b/WhatsNewInCSharp9.pptx
@@ -395,7 +395,7 @@
           <a:p>
             <a:fld id="{5EFEF8D7-FC42-4093-B868-45CA60192777}" type="datetimeFigureOut">
               <a:rPr lang="en-US" smtClean="0"/>
-              <a:t>12/9/2020</a:t>
+              <a:t>12/10/2020</a:t>
             </a:fld>
             <a:endParaRPr lang="en-US"/>
           </a:p>
@@ -809,7 +809,7 @@
           <a:p>
             <a:fld id="{5EFEF8D7-FC42-4093-B868-45CA60192777}" type="datetimeFigureOut">
               <a:rPr lang="en-US" smtClean="0"/>
-              <a:t>12/9/2020</a:t>
+              <a:t>12/10/2020</a:t>
             </a:fld>
             <a:endParaRPr lang="en-US"/>
           </a:p>
@@ -1145,7 +1145,7 @@
           <a:p>
             <a:fld id="{5EFEF8D7-FC42-4093-B868-45CA60192777}" type="datetimeFigureOut">
               <a:rPr lang="en-US" smtClean="0"/>
-              <a:t>12/9/2020</a:t>
+              <a:t>12/10/2020</a:t>
             </a:fld>
             <a:endParaRPr lang="en-US"/>
           </a:p>
@@ -1550,7 +1550,7 @@
           <a:p>
             <a:fld id="{5EFEF8D7-FC42-4093-B868-45CA60192777}" type="datetimeFigureOut">
               <a:rPr lang="en-US" smtClean="0"/>
-              <a:t>12/9/2020</a:t>
+              <a:t>12/10/2020</a:t>
             </a:fld>
             <a:endParaRPr lang="en-US"/>
           </a:p>
@@ -2118,7 +2118,7 @@
           <a:p>
             <a:fld id="{5EFEF8D7-FC42-4093-B868-45CA60192777}" type="datetimeFigureOut">
               <a:rPr lang="en-US" smtClean="0"/>
-              <a:t>12/9/2020</a:t>
+              <a:t>12/10/2020</a:t>
             </a:fld>
             <a:endParaRPr lang="en-US"/>
           </a:p>
@@ -2799,7 +2799,7 @@
           <a:p>
             <a:fld id="{5EFEF8D7-FC42-4093-B868-45CA60192777}" type="datetimeFigureOut">
               <a:rPr lang="en-US" smtClean="0"/>
-              <a:t>12/9/2020</a:t>
+              <a:t>12/10/2020</a:t>
             </a:fld>
             <a:endParaRPr lang="en-US"/>
           </a:p>
@@ -3712,7 +3712,7 @@
           <a:p>
             <a:fld id="{5EFEF8D7-FC42-4093-B868-45CA60192777}" type="datetimeFigureOut">
               <a:rPr lang="en-US" smtClean="0"/>
-              <a:t>12/9/2020</a:t>
+              <a:t>12/10/2020</a:t>
             </a:fld>
             <a:endParaRPr lang="en-US"/>
           </a:p>
@@ -4025,7 +4025,7 @@
           <a:p>
             <a:fld id="{5EFEF8D7-FC42-4093-B868-45CA60192777}" type="datetimeFigureOut">
               <a:rPr lang="en-US" smtClean="0"/>
-              <a:t>12/9/2020</a:t>
+              <a:t>12/10/2020</a:t>
             </a:fld>
             <a:endParaRPr lang="en-US"/>
           </a:p>
@@ -4289,7 +4289,7 @@
           <a:p>
             <a:fld id="{5EFEF8D7-FC42-4093-B868-45CA60192777}" type="datetimeFigureOut">
               <a:rPr lang="en-US" smtClean="0"/>
-              <a:t>12/9/2020</a:t>
+              <a:t>12/10/2020</a:t>
             </a:fld>
             <a:endParaRPr lang="en-US"/>
           </a:p>
@@ -4612,7 +4612,7 @@
           <a:p>
             <a:fld id="{5EFEF8D7-FC42-4093-B868-45CA60192777}" type="datetimeFigureOut">
               <a:rPr lang="en-US" smtClean="0"/>
-              <a:t>12/9/2020</a:t>
+              <a:t>12/10/2020</a:t>
             </a:fld>
             <a:endParaRPr lang="en-US"/>
           </a:p>
@@ -5001,7 +5001,7 @@
           <a:p>
             <a:fld id="{5EFEF8D7-FC42-4093-B868-45CA60192777}" type="datetimeFigureOut">
               <a:rPr lang="en-US" smtClean="0"/>
-              <a:t>12/9/2020</a:t>
+              <a:t>12/10/2020</a:t>
             </a:fld>
             <a:endParaRPr lang="en-US"/>
           </a:p>
@@ -5377,7 +5377,7 @@
           <a:p>
             <a:fld id="{5EFEF8D7-FC42-4093-B868-45CA60192777}" type="datetimeFigureOut">
               <a:rPr lang="en-US" smtClean="0"/>
-              <a:t>12/9/2020</a:t>
+              <a:t>12/10/2020</a:t>
             </a:fld>
             <a:endParaRPr lang="en-US"/>
           </a:p>
@@ -5883,7 +5883,7 @@
           <a:p>
             <a:fld id="{5EFEF8D7-FC42-4093-B868-45CA60192777}" type="datetimeFigureOut">
               <a:rPr lang="en-US" smtClean="0"/>
-              <a:t>12/9/2020</a:t>
+              <a:t>12/10/2020</a:t>
             </a:fld>
             <a:endParaRPr lang="en-US"/>
           </a:p>
@@ -6140,7 +6140,7 @@
           <a:p>
             <a:fld id="{5EFEF8D7-FC42-4093-B868-45CA60192777}" type="datetimeFigureOut">
               <a:rPr lang="en-US" smtClean="0"/>
-              <a:t>12/9/2020</a:t>
+              <a:t>12/10/2020</a:t>
             </a:fld>
             <a:endParaRPr lang="en-US"/>
           </a:p>
@@ -6303,7 +6303,7 @@
           <a:p>
             <a:fld id="{5EFEF8D7-FC42-4093-B868-45CA60192777}" type="datetimeFigureOut">
               <a:rPr lang="en-US" smtClean="0"/>
-              <a:t>12/9/2020</a:t>
+              <a:t>12/10/2020</a:t>
             </a:fld>
             <a:endParaRPr lang="en-US"/>
           </a:p>
@@ -6693,7 +6693,7 @@
           <a:p>
             <a:fld id="{5EFEF8D7-FC42-4093-B868-45CA60192777}" type="datetimeFigureOut">
               <a:rPr lang="en-US" smtClean="0"/>
-              <a:t>12/9/2020</a:t>
+              <a:t>12/10/2020</a:t>
             </a:fld>
             <a:endParaRPr lang="en-US"/>
           </a:p>
@@ -7102,7 +7102,7 @@
           <a:p>
             <a:fld id="{5EFEF8D7-FC42-4093-B868-45CA60192777}" type="datetimeFigureOut">
               <a:rPr lang="en-US" smtClean="0"/>
-              <a:t>12/9/2020</a:t>
+              <a:t>12/10/2020</a:t>
             </a:fld>
             <a:endParaRPr lang="en-US"/>
           </a:p>
@@ -7346,7 +7346,7 @@
           <a:p>
             <a:fld id="{5EFEF8D7-FC42-4093-B868-45CA60192777}" type="datetimeFigureOut">
               <a:rPr lang="en-US" smtClean="0"/>
-              <a:t>12/9/2020</a:t>
+              <a:t>12/10/2020</a:t>
             </a:fld>
             <a:endParaRPr lang="en-US"/>
           </a:p>
@@ -7896,7 +7896,7 @@
         <p:spPr/>
         <p:txBody>
           <a:bodyPr>
-            <a:normAutofit/>
+            <a:normAutofit fontScale="92500" lnSpcReduction="10000"/>
           </a:bodyPr>
           <a:lstStyle/>
           <a:p>
@@ -7966,6 +7966,30 @@
                 <a:hlinkClick r:id="rId5"/>
               </a:rPr>
               <a:t>https://github.com/JoeMayo/LinqToTwitter</a:t>
+            </a:r>
+            <a:endParaRPr lang="en-US" dirty="0"/>
+          </a:p>
+          <a:p>
+            <a:r>
+              <a:rPr lang="en-US" dirty="0" err="1"/>
+              <a:t>ILSpy</a:t>
+            </a:r>
+            <a:r>
+              <a:rPr lang="en-US" dirty="0"/>
+              <a:t>:</a:t>
+            </a:r>
+          </a:p>
+          <a:p>
+            <a:pPr lvl="1"/>
+            <a:r>
+              <a:rPr lang="en-US">
+                <a:hlinkClick r:id="rId6"/>
+              </a:rPr>
+              <a:t>https://github.com/icsharpcode/ILSpy</a:t>
+            </a:r>
+            <a:r>
+              <a:rPr lang="en-US"/>
+              <a:t> </a:t>
             </a:r>
             <a:endParaRPr lang="en-US" dirty="0"/>
           </a:p>

</xml_diff>

<commit_message>
Updated PowerPoint record description and code formatting.
</commit_message>
<xml_diff>
--- a/WhatsNewInCSharp9.pptx
+++ b/WhatsNewInCSharp9.pptx
@@ -8595,8 +8595,13 @@
           <a:p>
             <a:r>
               <a:rPr lang="en-US" dirty="0"/>
-              <a:t>Reference type with value semantics</a:t>
-            </a:r>
+              <a:t>Reference type with </a:t>
+            </a:r>
+            <a:r>
+              <a:rPr lang="en-US"/>
+              <a:t>value equality</a:t>
+            </a:r>
+            <a:endParaRPr lang="en-US" dirty="0"/>
           </a:p>
           <a:p>
             <a:endParaRPr lang="en-US" dirty="0"/>

</xml_diff>